<commit_message>
feat: Add simple file search (non full-text) and advanced files/folders tagging
</commit_message>
<xml_diff>
--- a/media/office-template/empty.pptx
+++ b/media/office-template/empty.pptx
@@ -1,6 +1,6 @@
 
 <file path=ppt/presentation.xml><?xml version="1.0" encoding="utf-8"?>
-<p:presentation xmlns:a="http://schemas.openxmlformats.org/drawingml/2006/main" xmlns:r="http://schemas.openxmlformats.org/officeDocument/2006/relationships" xmlns:p="http://schemas.openxmlformats.org/presentationml/2006/main" removePersonalInfoOnSave="1" saveSubsetFonts="1" autoCompressPictures="0">
+<p:presentation xmlns:a="http://schemas.openxmlformats.org/drawingml/2006/main" xmlns:r="http://schemas.openxmlformats.org/officeDocument/2006/relationships" xmlns:p="http://schemas.openxmlformats.org/presentationml/2006/main" saveSubsetFonts="1">
   <p:sldMasterIdLst>
     <p:sldMasterId id="2147483648" r:id="rId1"/>
   </p:sldMasterIdLst>
@@ -154,9 +154,10 @@
           </a:lstStyle>
           <a:p>
             <a:r>
-              <a:rPr lang="en-US"/>
+              <a:rPr lang="en-US" smtClean="0"/>
               <a:t>Click to edit Master title style</a:t>
             </a:r>
+            <a:endParaRPr lang="en-US"/>
           </a:p>
         </p:txBody>
       </p:sp>
@@ -218,9 +219,10 @@
           </a:lstStyle>
           <a:p>
             <a:r>
-              <a:rPr lang="en-US"/>
+              <a:rPr lang="en-US" smtClean="0"/>
               <a:t>Click to edit Master subtitle style</a:t>
             </a:r>
+            <a:endParaRPr lang="en-US"/>
           </a:p>
         </p:txBody>
       </p:sp>
@@ -239,9 +241,9 @@
           <a:bodyPr/>
           <a:lstStyle/>
           <a:p>
-            <a:fld id="{9ED3734C-ACA2-CD44-9419-3EA4E9A728CC}" type="datetimeFigureOut">
-              <a:rPr lang="en-US" smtClean="0"/>
-              <a:t>12/5/2019</a:t>
+            <a:fld id="{F1FA7AC5-6045-4418-8E60-F48788734473}" type="datetimeFigureOut">
+              <a:rPr lang="en-US" smtClean="0"/>
+              <a:t>7/26/2012</a:t>
             </a:fld>
             <a:endParaRPr lang="en-US"/>
           </a:p>
@@ -281,7 +283,7 @@
           <a:bodyPr/>
           <a:lstStyle/>
           <a:p>
-            <a:fld id="{1F412440-1B23-604B-B178-CB159C9EC6EA}" type="slidenum">
+            <a:fld id="{8C71CAF9-4461-454A-B702-D536C3775752}" type="slidenum">
               <a:rPr lang="en-US" smtClean="0"/>
               <a:t>‹#›</a:t>
             </a:fld>
@@ -292,7 +294,7 @@
     </p:spTree>
     <p:extLst>
       <p:ext uri="{BB962C8B-B14F-4D97-AF65-F5344CB8AC3E}">
-        <p14:creationId xmlns:p14="http://schemas.microsoft.com/office/powerpoint/2010/main" val="454571334"/>
+        <p14:creationId xmlns:p14="http://schemas.microsoft.com/office/powerpoint/2010/main" val="508168537"/>
       </p:ext>
     </p:extLst>
   </p:cSld>
@@ -335,9 +337,10 @@
           <a:lstStyle/>
           <a:p>
             <a:r>
-              <a:rPr lang="en-US"/>
+              <a:rPr lang="en-US" smtClean="0"/>
               <a:t>Click to edit Master title style</a:t>
             </a:r>
+            <a:endParaRPr lang="en-US"/>
           </a:p>
         </p:txBody>
       </p:sp>
@@ -358,37 +361,38 @@
           <a:p>
             <a:pPr lvl="0"/>
             <a:r>
-              <a:rPr lang="en-US"/>
+              <a:rPr lang="en-US" smtClean="0"/>
               <a:t>Click to edit Master text styles</a:t>
             </a:r>
           </a:p>
           <a:p>
             <a:pPr lvl="1"/>
             <a:r>
-              <a:rPr lang="en-US"/>
+              <a:rPr lang="en-US" smtClean="0"/>
               <a:t>Second level</a:t>
             </a:r>
           </a:p>
           <a:p>
             <a:pPr lvl="2"/>
             <a:r>
-              <a:rPr lang="en-US"/>
+              <a:rPr lang="en-US" smtClean="0"/>
               <a:t>Third level</a:t>
             </a:r>
           </a:p>
           <a:p>
             <a:pPr lvl="3"/>
             <a:r>
-              <a:rPr lang="en-US"/>
+              <a:rPr lang="en-US" smtClean="0"/>
               <a:t>Fourth level</a:t>
             </a:r>
           </a:p>
           <a:p>
             <a:pPr lvl="4"/>
             <a:r>
-              <a:rPr lang="en-US"/>
+              <a:rPr lang="en-US" smtClean="0"/>
               <a:t>Fifth level</a:t>
             </a:r>
+            <a:endParaRPr lang="en-US"/>
           </a:p>
         </p:txBody>
       </p:sp>
@@ -407,9 +411,9 @@
           <a:bodyPr/>
           <a:lstStyle/>
           <a:p>
-            <a:fld id="{9ED3734C-ACA2-CD44-9419-3EA4E9A728CC}" type="datetimeFigureOut">
-              <a:rPr lang="en-US" smtClean="0"/>
-              <a:t>12/5/2019</a:t>
+            <a:fld id="{F1FA7AC5-6045-4418-8E60-F48788734473}" type="datetimeFigureOut">
+              <a:rPr lang="en-US" smtClean="0"/>
+              <a:t>7/26/2012</a:t>
             </a:fld>
             <a:endParaRPr lang="en-US"/>
           </a:p>
@@ -449,7 +453,7 @@
           <a:bodyPr/>
           <a:lstStyle/>
           <a:p>
-            <a:fld id="{1F412440-1B23-604B-B178-CB159C9EC6EA}" type="slidenum">
+            <a:fld id="{8C71CAF9-4461-454A-B702-D536C3775752}" type="slidenum">
               <a:rPr lang="en-US" smtClean="0"/>
               <a:t>‹#›</a:t>
             </a:fld>
@@ -460,7 +464,7 @@
     </p:spTree>
     <p:extLst>
       <p:ext uri="{BB962C8B-B14F-4D97-AF65-F5344CB8AC3E}">
-        <p14:creationId xmlns:p14="http://schemas.microsoft.com/office/powerpoint/2010/main" val="821528851"/>
+        <p14:creationId xmlns:p14="http://schemas.microsoft.com/office/powerpoint/2010/main" val="613236000"/>
       </p:ext>
     </p:extLst>
   </p:cSld>
@@ -508,9 +512,10 @@
           <a:lstStyle/>
           <a:p>
             <a:r>
-              <a:rPr lang="en-US"/>
+              <a:rPr lang="en-US" smtClean="0"/>
               <a:t>Click to edit Master title style</a:t>
             </a:r>
+            <a:endParaRPr lang="en-US"/>
           </a:p>
         </p:txBody>
       </p:sp>
@@ -536,37 +541,38 @@
           <a:p>
             <a:pPr lvl="0"/>
             <a:r>
-              <a:rPr lang="en-US"/>
+              <a:rPr lang="en-US" smtClean="0"/>
               <a:t>Click to edit Master text styles</a:t>
             </a:r>
           </a:p>
           <a:p>
             <a:pPr lvl="1"/>
             <a:r>
-              <a:rPr lang="en-US"/>
+              <a:rPr lang="en-US" smtClean="0"/>
               <a:t>Second level</a:t>
             </a:r>
           </a:p>
           <a:p>
             <a:pPr lvl="2"/>
             <a:r>
-              <a:rPr lang="en-US"/>
+              <a:rPr lang="en-US" smtClean="0"/>
               <a:t>Third level</a:t>
             </a:r>
           </a:p>
           <a:p>
             <a:pPr lvl="3"/>
             <a:r>
-              <a:rPr lang="en-US"/>
+              <a:rPr lang="en-US" smtClean="0"/>
               <a:t>Fourth level</a:t>
             </a:r>
           </a:p>
           <a:p>
             <a:pPr lvl="4"/>
             <a:r>
-              <a:rPr lang="en-US"/>
+              <a:rPr lang="en-US" smtClean="0"/>
               <a:t>Fifth level</a:t>
             </a:r>
+            <a:endParaRPr lang="en-US"/>
           </a:p>
         </p:txBody>
       </p:sp>
@@ -585,9 +591,9 @@
           <a:bodyPr/>
           <a:lstStyle/>
           <a:p>
-            <a:fld id="{9ED3734C-ACA2-CD44-9419-3EA4E9A728CC}" type="datetimeFigureOut">
-              <a:rPr lang="en-US" smtClean="0"/>
-              <a:t>12/5/2019</a:t>
+            <a:fld id="{F1FA7AC5-6045-4418-8E60-F48788734473}" type="datetimeFigureOut">
+              <a:rPr lang="en-US" smtClean="0"/>
+              <a:t>7/26/2012</a:t>
             </a:fld>
             <a:endParaRPr lang="en-US"/>
           </a:p>
@@ -627,7 +633,7 @@
           <a:bodyPr/>
           <a:lstStyle/>
           <a:p>
-            <a:fld id="{1F412440-1B23-604B-B178-CB159C9EC6EA}" type="slidenum">
+            <a:fld id="{8C71CAF9-4461-454A-B702-D536C3775752}" type="slidenum">
               <a:rPr lang="en-US" smtClean="0"/>
               <a:t>‹#›</a:t>
             </a:fld>
@@ -638,7 +644,7 @@
     </p:spTree>
     <p:extLst>
       <p:ext uri="{BB962C8B-B14F-4D97-AF65-F5344CB8AC3E}">
-        <p14:creationId xmlns:p14="http://schemas.microsoft.com/office/powerpoint/2010/main" val="1263032194"/>
+        <p14:creationId xmlns:p14="http://schemas.microsoft.com/office/powerpoint/2010/main" val="2660566950"/>
       </p:ext>
     </p:extLst>
   </p:cSld>
@@ -681,9 +687,10 @@
           <a:lstStyle/>
           <a:p>
             <a:r>
-              <a:rPr lang="en-US"/>
+              <a:rPr lang="en-US" smtClean="0"/>
               <a:t>Click to edit Master title style</a:t>
             </a:r>
+            <a:endParaRPr lang="en-US"/>
           </a:p>
         </p:txBody>
       </p:sp>
@@ -704,37 +711,38 @@
           <a:p>
             <a:pPr lvl="0"/>
             <a:r>
-              <a:rPr lang="en-US"/>
+              <a:rPr lang="en-US" smtClean="0"/>
               <a:t>Click to edit Master text styles</a:t>
             </a:r>
           </a:p>
           <a:p>
             <a:pPr lvl="1"/>
             <a:r>
-              <a:rPr lang="en-US"/>
+              <a:rPr lang="en-US" smtClean="0"/>
               <a:t>Second level</a:t>
             </a:r>
           </a:p>
           <a:p>
             <a:pPr lvl="2"/>
             <a:r>
-              <a:rPr lang="en-US"/>
+              <a:rPr lang="en-US" smtClean="0"/>
               <a:t>Third level</a:t>
             </a:r>
           </a:p>
           <a:p>
             <a:pPr lvl="3"/>
             <a:r>
-              <a:rPr lang="en-US"/>
+              <a:rPr lang="en-US" smtClean="0"/>
               <a:t>Fourth level</a:t>
             </a:r>
           </a:p>
           <a:p>
             <a:pPr lvl="4"/>
             <a:r>
-              <a:rPr lang="en-US"/>
+              <a:rPr lang="en-US" smtClean="0"/>
               <a:t>Fifth level</a:t>
             </a:r>
+            <a:endParaRPr lang="en-US"/>
           </a:p>
         </p:txBody>
       </p:sp>
@@ -753,9 +761,9 @@
           <a:bodyPr/>
           <a:lstStyle/>
           <a:p>
-            <a:fld id="{9ED3734C-ACA2-CD44-9419-3EA4E9A728CC}" type="datetimeFigureOut">
-              <a:rPr lang="en-US" smtClean="0"/>
-              <a:t>12/5/2019</a:t>
+            <a:fld id="{F1FA7AC5-6045-4418-8E60-F48788734473}" type="datetimeFigureOut">
+              <a:rPr lang="en-US" smtClean="0"/>
+              <a:t>7/26/2012</a:t>
             </a:fld>
             <a:endParaRPr lang="en-US"/>
           </a:p>
@@ -795,7 +803,7 @@
           <a:bodyPr/>
           <a:lstStyle/>
           <a:p>
-            <a:fld id="{1F412440-1B23-604B-B178-CB159C9EC6EA}" type="slidenum">
+            <a:fld id="{8C71CAF9-4461-454A-B702-D536C3775752}" type="slidenum">
               <a:rPr lang="en-US" smtClean="0"/>
               <a:t>‹#›</a:t>
             </a:fld>
@@ -806,7 +814,7 @@
     </p:spTree>
     <p:extLst>
       <p:ext uri="{BB962C8B-B14F-4D97-AF65-F5344CB8AC3E}">
-        <p14:creationId xmlns:p14="http://schemas.microsoft.com/office/powerpoint/2010/main" val="1381078159"/>
+        <p14:creationId xmlns:p14="http://schemas.microsoft.com/office/powerpoint/2010/main" val="3386326818"/>
       </p:ext>
     </p:extLst>
   </p:cSld>
@@ -858,9 +866,10 @@
           </a:lstStyle>
           <a:p>
             <a:r>
-              <a:rPr lang="en-US"/>
+              <a:rPr lang="en-US" smtClean="0"/>
               <a:t>Click to edit Master title style</a:t>
             </a:r>
+            <a:endParaRPr lang="en-US"/>
           </a:p>
         </p:txBody>
       </p:sp>
@@ -977,7 +986,7 @@
           <a:p>
             <a:pPr lvl="0"/>
             <a:r>
-              <a:rPr lang="en-US"/>
+              <a:rPr lang="en-US" smtClean="0"/>
               <a:t>Click to edit Master text styles</a:t>
             </a:r>
           </a:p>
@@ -998,9 +1007,9 @@
           <a:bodyPr/>
           <a:lstStyle/>
           <a:p>
-            <a:fld id="{9ED3734C-ACA2-CD44-9419-3EA4E9A728CC}" type="datetimeFigureOut">
-              <a:rPr lang="en-US" smtClean="0"/>
-              <a:t>12/5/2019</a:t>
+            <a:fld id="{F1FA7AC5-6045-4418-8E60-F48788734473}" type="datetimeFigureOut">
+              <a:rPr lang="en-US" smtClean="0"/>
+              <a:t>7/26/2012</a:t>
             </a:fld>
             <a:endParaRPr lang="en-US"/>
           </a:p>
@@ -1040,7 +1049,7 @@
           <a:bodyPr/>
           <a:lstStyle/>
           <a:p>
-            <a:fld id="{1F412440-1B23-604B-B178-CB159C9EC6EA}" type="slidenum">
+            <a:fld id="{8C71CAF9-4461-454A-B702-D536C3775752}" type="slidenum">
               <a:rPr lang="en-US" smtClean="0"/>
               <a:t>‹#›</a:t>
             </a:fld>
@@ -1051,7 +1060,7 @@
     </p:spTree>
     <p:extLst>
       <p:ext uri="{BB962C8B-B14F-4D97-AF65-F5344CB8AC3E}">
-        <p14:creationId xmlns:p14="http://schemas.microsoft.com/office/powerpoint/2010/main" val="1777361537"/>
+        <p14:creationId xmlns:p14="http://schemas.microsoft.com/office/powerpoint/2010/main" val="1875206763"/>
       </p:ext>
     </p:extLst>
   </p:cSld>
@@ -1094,9 +1103,10 @@
           <a:lstStyle/>
           <a:p>
             <a:r>
-              <a:rPr lang="en-US"/>
+              <a:rPr lang="en-US" smtClean="0"/>
               <a:t>Click to edit Master title style</a:t>
             </a:r>
+            <a:endParaRPr lang="en-US"/>
           </a:p>
         </p:txBody>
       </p:sp>
@@ -1122,37 +1132,38 @@
           <a:p>
             <a:pPr lvl="0"/>
             <a:r>
-              <a:rPr lang="en-US"/>
+              <a:rPr lang="en-US" smtClean="0"/>
               <a:t>Click to edit Master text styles</a:t>
             </a:r>
           </a:p>
           <a:p>
             <a:pPr lvl="1"/>
             <a:r>
-              <a:rPr lang="en-US"/>
+              <a:rPr lang="en-US" smtClean="0"/>
               <a:t>Second level</a:t>
             </a:r>
           </a:p>
           <a:p>
             <a:pPr lvl="2"/>
             <a:r>
-              <a:rPr lang="en-US"/>
+              <a:rPr lang="en-US" smtClean="0"/>
               <a:t>Third level</a:t>
             </a:r>
           </a:p>
           <a:p>
             <a:pPr lvl="3"/>
             <a:r>
-              <a:rPr lang="en-US"/>
+              <a:rPr lang="en-US" smtClean="0"/>
               <a:t>Fourth level</a:t>
             </a:r>
           </a:p>
           <a:p>
             <a:pPr lvl="4"/>
             <a:r>
-              <a:rPr lang="en-US"/>
+              <a:rPr lang="en-US" smtClean="0"/>
               <a:t>Fifth level</a:t>
             </a:r>
+            <a:endParaRPr lang="en-US"/>
           </a:p>
         </p:txBody>
       </p:sp>
@@ -1178,37 +1189,38 @@
           <a:p>
             <a:pPr lvl="0"/>
             <a:r>
-              <a:rPr lang="en-US"/>
+              <a:rPr lang="en-US" smtClean="0"/>
               <a:t>Click to edit Master text styles</a:t>
             </a:r>
           </a:p>
           <a:p>
             <a:pPr lvl="1"/>
             <a:r>
-              <a:rPr lang="en-US"/>
+              <a:rPr lang="en-US" smtClean="0"/>
               <a:t>Second level</a:t>
             </a:r>
           </a:p>
           <a:p>
             <a:pPr lvl="2"/>
             <a:r>
-              <a:rPr lang="en-US"/>
+              <a:rPr lang="en-US" smtClean="0"/>
               <a:t>Third level</a:t>
             </a:r>
           </a:p>
           <a:p>
             <a:pPr lvl="3"/>
             <a:r>
-              <a:rPr lang="en-US"/>
+              <a:rPr lang="en-US" smtClean="0"/>
               <a:t>Fourth level</a:t>
             </a:r>
           </a:p>
           <a:p>
             <a:pPr lvl="4"/>
             <a:r>
-              <a:rPr lang="en-US"/>
+              <a:rPr lang="en-US" smtClean="0"/>
               <a:t>Fifth level</a:t>
             </a:r>
+            <a:endParaRPr lang="en-US"/>
           </a:p>
         </p:txBody>
       </p:sp>
@@ -1227,9 +1239,9 @@
           <a:bodyPr/>
           <a:lstStyle/>
           <a:p>
-            <a:fld id="{9ED3734C-ACA2-CD44-9419-3EA4E9A728CC}" type="datetimeFigureOut">
-              <a:rPr lang="en-US" smtClean="0"/>
-              <a:t>12/5/2019</a:t>
+            <a:fld id="{F1FA7AC5-6045-4418-8E60-F48788734473}" type="datetimeFigureOut">
+              <a:rPr lang="en-US" smtClean="0"/>
+              <a:t>7/26/2012</a:t>
             </a:fld>
             <a:endParaRPr lang="en-US"/>
           </a:p>
@@ -1269,7 +1281,7 @@
           <a:bodyPr/>
           <a:lstStyle/>
           <a:p>
-            <a:fld id="{1F412440-1B23-604B-B178-CB159C9EC6EA}" type="slidenum">
+            <a:fld id="{8C71CAF9-4461-454A-B702-D536C3775752}" type="slidenum">
               <a:rPr lang="en-US" smtClean="0"/>
               <a:t>‹#›</a:t>
             </a:fld>
@@ -1280,7 +1292,7 @@
     </p:spTree>
     <p:extLst>
       <p:ext uri="{BB962C8B-B14F-4D97-AF65-F5344CB8AC3E}">
-        <p14:creationId xmlns:p14="http://schemas.microsoft.com/office/powerpoint/2010/main" val="617822589"/>
+        <p14:creationId xmlns:p14="http://schemas.microsoft.com/office/powerpoint/2010/main" val="3401293223"/>
       </p:ext>
     </p:extLst>
   </p:cSld>
@@ -1328,9 +1340,10 @@
           <a:lstStyle/>
           <a:p>
             <a:r>
-              <a:rPr lang="en-US"/>
+              <a:rPr lang="en-US" smtClean="0"/>
               <a:t>Click to edit Master title style</a:t>
             </a:r>
+            <a:endParaRPr lang="en-US"/>
           </a:p>
         </p:txBody>
       </p:sp>
@@ -1393,7 +1406,7 @@
           <a:p>
             <a:pPr lvl="0"/>
             <a:r>
-              <a:rPr lang="en-US"/>
+              <a:rPr lang="en-US" smtClean="0"/>
               <a:t>Click to edit Master text styles</a:t>
             </a:r>
           </a:p>
@@ -1421,37 +1434,38 @@
           <a:p>
             <a:pPr lvl="0"/>
             <a:r>
-              <a:rPr lang="en-US"/>
+              <a:rPr lang="en-US" smtClean="0"/>
               <a:t>Click to edit Master text styles</a:t>
             </a:r>
           </a:p>
           <a:p>
             <a:pPr lvl="1"/>
             <a:r>
-              <a:rPr lang="en-US"/>
+              <a:rPr lang="en-US" smtClean="0"/>
               <a:t>Second level</a:t>
             </a:r>
           </a:p>
           <a:p>
             <a:pPr lvl="2"/>
             <a:r>
-              <a:rPr lang="en-US"/>
+              <a:rPr lang="en-US" smtClean="0"/>
               <a:t>Third level</a:t>
             </a:r>
           </a:p>
           <a:p>
             <a:pPr lvl="3"/>
             <a:r>
-              <a:rPr lang="en-US"/>
+              <a:rPr lang="en-US" smtClean="0"/>
               <a:t>Fourth level</a:t>
             </a:r>
           </a:p>
           <a:p>
             <a:pPr lvl="4"/>
             <a:r>
-              <a:rPr lang="en-US"/>
+              <a:rPr lang="en-US" smtClean="0"/>
               <a:t>Fifth level</a:t>
             </a:r>
+            <a:endParaRPr lang="en-US"/>
           </a:p>
         </p:txBody>
       </p:sp>
@@ -1514,7 +1528,7 @@
           <a:p>
             <a:pPr lvl="0"/>
             <a:r>
-              <a:rPr lang="en-US"/>
+              <a:rPr lang="en-US" smtClean="0"/>
               <a:t>Click to edit Master text styles</a:t>
             </a:r>
           </a:p>
@@ -1542,37 +1556,38 @@
           <a:p>
             <a:pPr lvl="0"/>
             <a:r>
-              <a:rPr lang="en-US"/>
+              <a:rPr lang="en-US" smtClean="0"/>
               <a:t>Click to edit Master text styles</a:t>
             </a:r>
           </a:p>
           <a:p>
             <a:pPr lvl="1"/>
             <a:r>
-              <a:rPr lang="en-US"/>
+              <a:rPr lang="en-US" smtClean="0"/>
               <a:t>Second level</a:t>
             </a:r>
           </a:p>
           <a:p>
             <a:pPr lvl="2"/>
             <a:r>
-              <a:rPr lang="en-US"/>
+              <a:rPr lang="en-US" smtClean="0"/>
               <a:t>Third level</a:t>
             </a:r>
           </a:p>
           <a:p>
             <a:pPr lvl="3"/>
             <a:r>
-              <a:rPr lang="en-US"/>
+              <a:rPr lang="en-US" smtClean="0"/>
               <a:t>Fourth level</a:t>
             </a:r>
           </a:p>
           <a:p>
             <a:pPr lvl="4"/>
             <a:r>
-              <a:rPr lang="en-US"/>
+              <a:rPr lang="en-US" smtClean="0"/>
               <a:t>Fifth level</a:t>
             </a:r>
+            <a:endParaRPr lang="en-US"/>
           </a:p>
         </p:txBody>
       </p:sp>
@@ -1591,9 +1606,9 @@
           <a:bodyPr/>
           <a:lstStyle/>
           <a:p>
-            <a:fld id="{9ED3734C-ACA2-CD44-9419-3EA4E9A728CC}" type="datetimeFigureOut">
-              <a:rPr lang="en-US" smtClean="0"/>
-              <a:t>12/5/2019</a:t>
+            <a:fld id="{F1FA7AC5-6045-4418-8E60-F48788734473}" type="datetimeFigureOut">
+              <a:rPr lang="en-US" smtClean="0"/>
+              <a:t>7/26/2012</a:t>
             </a:fld>
             <a:endParaRPr lang="en-US"/>
           </a:p>
@@ -1633,7 +1648,7 @@
           <a:bodyPr/>
           <a:lstStyle/>
           <a:p>
-            <a:fld id="{1F412440-1B23-604B-B178-CB159C9EC6EA}" type="slidenum">
+            <a:fld id="{8C71CAF9-4461-454A-B702-D536C3775752}" type="slidenum">
               <a:rPr lang="en-US" smtClean="0"/>
               <a:t>‹#›</a:t>
             </a:fld>
@@ -1644,7 +1659,7 @@
     </p:spTree>
     <p:extLst>
       <p:ext uri="{BB962C8B-B14F-4D97-AF65-F5344CB8AC3E}">
-        <p14:creationId xmlns:p14="http://schemas.microsoft.com/office/powerpoint/2010/main" val="660820078"/>
+        <p14:creationId xmlns:p14="http://schemas.microsoft.com/office/powerpoint/2010/main" val="3056490410"/>
       </p:ext>
     </p:extLst>
   </p:cSld>
@@ -1687,9 +1702,10 @@
           <a:lstStyle/>
           <a:p>
             <a:r>
-              <a:rPr lang="en-US"/>
+              <a:rPr lang="en-US" smtClean="0"/>
               <a:t>Click to edit Master title style</a:t>
             </a:r>
+            <a:endParaRPr lang="en-US"/>
           </a:p>
         </p:txBody>
       </p:sp>
@@ -1708,9 +1724,9 @@
           <a:bodyPr/>
           <a:lstStyle/>
           <a:p>
-            <a:fld id="{9ED3734C-ACA2-CD44-9419-3EA4E9A728CC}" type="datetimeFigureOut">
-              <a:rPr lang="en-US" smtClean="0"/>
-              <a:t>12/5/2019</a:t>
+            <a:fld id="{F1FA7AC5-6045-4418-8E60-F48788734473}" type="datetimeFigureOut">
+              <a:rPr lang="en-US" smtClean="0"/>
+              <a:t>7/26/2012</a:t>
             </a:fld>
             <a:endParaRPr lang="en-US"/>
           </a:p>
@@ -1750,7 +1766,7 @@
           <a:bodyPr/>
           <a:lstStyle/>
           <a:p>
-            <a:fld id="{1F412440-1B23-604B-B178-CB159C9EC6EA}" type="slidenum">
+            <a:fld id="{8C71CAF9-4461-454A-B702-D536C3775752}" type="slidenum">
               <a:rPr lang="en-US" smtClean="0"/>
               <a:t>‹#›</a:t>
             </a:fld>
@@ -1761,7 +1777,7 @@
     </p:spTree>
     <p:extLst>
       <p:ext uri="{BB962C8B-B14F-4D97-AF65-F5344CB8AC3E}">
-        <p14:creationId xmlns:p14="http://schemas.microsoft.com/office/powerpoint/2010/main" val="1765112309"/>
+        <p14:creationId xmlns:p14="http://schemas.microsoft.com/office/powerpoint/2010/main" val="3573976379"/>
       </p:ext>
     </p:extLst>
   </p:cSld>
@@ -1803,9 +1819,9 @@
           <a:bodyPr/>
           <a:lstStyle/>
           <a:p>
-            <a:fld id="{9ED3734C-ACA2-CD44-9419-3EA4E9A728CC}" type="datetimeFigureOut">
-              <a:rPr lang="en-US" smtClean="0"/>
-              <a:t>12/5/2019</a:t>
+            <a:fld id="{F1FA7AC5-6045-4418-8E60-F48788734473}" type="datetimeFigureOut">
+              <a:rPr lang="en-US" smtClean="0"/>
+              <a:t>7/26/2012</a:t>
             </a:fld>
             <a:endParaRPr lang="en-US"/>
           </a:p>
@@ -1845,7 +1861,7 @@
           <a:bodyPr/>
           <a:lstStyle/>
           <a:p>
-            <a:fld id="{1F412440-1B23-604B-B178-CB159C9EC6EA}" type="slidenum">
+            <a:fld id="{8C71CAF9-4461-454A-B702-D536C3775752}" type="slidenum">
               <a:rPr lang="en-US" smtClean="0"/>
               <a:t>‹#›</a:t>
             </a:fld>
@@ -1856,7 +1872,7 @@
     </p:spTree>
     <p:extLst>
       <p:ext uri="{BB962C8B-B14F-4D97-AF65-F5344CB8AC3E}">
-        <p14:creationId xmlns:p14="http://schemas.microsoft.com/office/powerpoint/2010/main" val="903477705"/>
+        <p14:creationId xmlns:p14="http://schemas.microsoft.com/office/powerpoint/2010/main" val="3201795056"/>
       </p:ext>
     </p:extLst>
   </p:cSld>
@@ -1908,9 +1924,10 @@
           </a:lstStyle>
           <a:p>
             <a:r>
-              <a:rPr lang="en-US"/>
+              <a:rPr lang="en-US" smtClean="0"/>
               <a:t>Click to edit Master title style</a:t>
             </a:r>
+            <a:endParaRPr lang="en-US"/>
           </a:p>
         </p:txBody>
       </p:sp>
@@ -1964,37 +1981,38 @@
           <a:p>
             <a:pPr lvl="0"/>
             <a:r>
-              <a:rPr lang="en-US"/>
+              <a:rPr lang="en-US" smtClean="0"/>
               <a:t>Click to edit Master text styles</a:t>
             </a:r>
           </a:p>
           <a:p>
             <a:pPr lvl="1"/>
             <a:r>
-              <a:rPr lang="en-US"/>
+              <a:rPr lang="en-US" smtClean="0"/>
               <a:t>Second level</a:t>
             </a:r>
           </a:p>
           <a:p>
             <a:pPr lvl="2"/>
             <a:r>
-              <a:rPr lang="en-US"/>
+              <a:rPr lang="en-US" smtClean="0"/>
               <a:t>Third level</a:t>
             </a:r>
           </a:p>
           <a:p>
             <a:pPr lvl="3"/>
             <a:r>
-              <a:rPr lang="en-US"/>
+              <a:rPr lang="en-US" smtClean="0"/>
               <a:t>Fourth level</a:t>
             </a:r>
           </a:p>
           <a:p>
             <a:pPr lvl="4"/>
             <a:r>
-              <a:rPr lang="en-US"/>
+              <a:rPr lang="en-US" smtClean="0"/>
               <a:t>Fifth level</a:t>
             </a:r>
+            <a:endParaRPr lang="en-US"/>
           </a:p>
         </p:txBody>
       </p:sp>
@@ -2057,7 +2075,7 @@
           <a:p>
             <a:pPr lvl="0"/>
             <a:r>
-              <a:rPr lang="en-US"/>
+              <a:rPr lang="en-US" smtClean="0"/>
               <a:t>Click to edit Master text styles</a:t>
             </a:r>
           </a:p>
@@ -2078,9 +2096,9 @@
           <a:bodyPr/>
           <a:lstStyle/>
           <a:p>
-            <a:fld id="{9ED3734C-ACA2-CD44-9419-3EA4E9A728CC}" type="datetimeFigureOut">
-              <a:rPr lang="en-US" smtClean="0"/>
-              <a:t>12/5/2019</a:t>
+            <a:fld id="{F1FA7AC5-6045-4418-8E60-F48788734473}" type="datetimeFigureOut">
+              <a:rPr lang="en-US" smtClean="0"/>
+              <a:t>7/26/2012</a:t>
             </a:fld>
             <a:endParaRPr lang="en-US"/>
           </a:p>
@@ -2120,7 +2138,7 @@
           <a:bodyPr/>
           <a:lstStyle/>
           <a:p>
-            <a:fld id="{1F412440-1B23-604B-B178-CB159C9EC6EA}" type="slidenum">
+            <a:fld id="{8C71CAF9-4461-454A-B702-D536C3775752}" type="slidenum">
               <a:rPr lang="en-US" smtClean="0"/>
               <a:t>‹#›</a:t>
             </a:fld>
@@ -2131,7 +2149,7 @@
     </p:spTree>
     <p:extLst>
       <p:ext uri="{BB962C8B-B14F-4D97-AF65-F5344CB8AC3E}">
-        <p14:creationId xmlns:p14="http://schemas.microsoft.com/office/powerpoint/2010/main" val="2040403645"/>
+        <p14:creationId xmlns:p14="http://schemas.microsoft.com/office/powerpoint/2010/main" val="2526201297"/>
       </p:ext>
     </p:extLst>
   </p:cSld>
@@ -2183,9 +2201,10 @@
           </a:lstStyle>
           <a:p>
             <a:r>
-              <a:rPr lang="en-US"/>
+              <a:rPr lang="en-US" smtClean="0"/>
               <a:t>Click to edit Master title style</a:t>
             </a:r>
+            <a:endParaRPr lang="en-US"/>
           </a:p>
         </p:txBody>
       </p:sp>
@@ -2309,7 +2328,7 @@
           <a:p>
             <a:pPr lvl="0"/>
             <a:r>
-              <a:rPr lang="en-US"/>
+              <a:rPr lang="en-US" smtClean="0"/>
               <a:t>Click to edit Master text styles</a:t>
             </a:r>
           </a:p>
@@ -2330,9 +2349,9 @@
           <a:bodyPr/>
           <a:lstStyle/>
           <a:p>
-            <a:fld id="{9ED3734C-ACA2-CD44-9419-3EA4E9A728CC}" type="datetimeFigureOut">
-              <a:rPr lang="en-US" smtClean="0"/>
-              <a:t>12/5/2019</a:t>
+            <a:fld id="{F1FA7AC5-6045-4418-8E60-F48788734473}" type="datetimeFigureOut">
+              <a:rPr lang="en-US" smtClean="0"/>
+              <a:t>7/26/2012</a:t>
             </a:fld>
             <a:endParaRPr lang="en-US"/>
           </a:p>
@@ -2372,7 +2391,7 @@
           <a:bodyPr/>
           <a:lstStyle/>
           <a:p>
-            <a:fld id="{1F412440-1B23-604B-B178-CB159C9EC6EA}" type="slidenum">
+            <a:fld id="{8C71CAF9-4461-454A-B702-D536C3775752}" type="slidenum">
               <a:rPr lang="en-US" smtClean="0"/>
               <a:t>‹#›</a:t>
             </a:fld>
@@ -2383,7 +2402,7 @@
     </p:spTree>
     <p:extLst>
       <p:ext uri="{BB962C8B-B14F-4D97-AF65-F5344CB8AC3E}">
-        <p14:creationId xmlns:p14="http://schemas.microsoft.com/office/powerpoint/2010/main" val="2045186219"/>
+        <p14:creationId xmlns:p14="http://schemas.microsoft.com/office/powerpoint/2010/main" val="242868210"/>
       </p:ext>
     </p:extLst>
   </p:cSld>
@@ -2441,9 +2460,10 @@
           <a:lstStyle/>
           <a:p>
             <a:r>
-              <a:rPr lang="en-US"/>
+              <a:rPr lang="en-US" smtClean="0"/>
               <a:t>Click to edit Master title style</a:t>
             </a:r>
+            <a:endParaRPr lang="en-US"/>
           </a:p>
         </p:txBody>
       </p:sp>
@@ -2474,37 +2494,38 @@
           <a:p>
             <a:pPr lvl="0"/>
             <a:r>
-              <a:rPr lang="en-US"/>
+              <a:rPr lang="en-US" smtClean="0"/>
               <a:t>Click to edit Master text styles</a:t>
             </a:r>
           </a:p>
           <a:p>
             <a:pPr lvl="1"/>
             <a:r>
-              <a:rPr lang="en-US"/>
+              <a:rPr lang="en-US" smtClean="0"/>
               <a:t>Second level</a:t>
             </a:r>
           </a:p>
           <a:p>
             <a:pPr lvl="2"/>
             <a:r>
-              <a:rPr lang="en-US"/>
+              <a:rPr lang="en-US" smtClean="0"/>
               <a:t>Third level</a:t>
             </a:r>
           </a:p>
           <a:p>
             <a:pPr lvl="3"/>
             <a:r>
-              <a:rPr lang="en-US"/>
+              <a:rPr lang="en-US" smtClean="0"/>
               <a:t>Fourth level</a:t>
             </a:r>
           </a:p>
           <a:p>
             <a:pPr lvl="4"/>
             <a:r>
-              <a:rPr lang="en-US"/>
+              <a:rPr lang="en-US" smtClean="0"/>
               <a:t>Fifth level</a:t>
             </a:r>
+            <a:endParaRPr lang="en-US"/>
           </a:p>
         </p:txBody>
       </p:sp>
@@ -2541,9 +2562,9 @@
             </a:lvl1pPr>
           </a:lstStyle>
           <a:p>
-            <a:fld id="{9ED3734C-ACA2-CD44-9419-3EA4E9A728CC}" type="datetimeFigureOut">
-              <a:rPr lang="en-US" smtClean="0"/>
-              <a:t>12/5/2019</a:t>
+            <a:fld id="{F1FA7AC5-6045-4418-8E60-F48788734473}" type="datetimeFigureOut">
+              <a:rPr lang="en-US" smtClean="0"/>
+              <a:t>7/26/2012</a:t>
             </a:fld>
             <a:endParaRPr lang="en-US"/>
           </a:p>
@@ -2619,7 +2640,7 @@
             </a:lvl1pPr>
           </a:lstStyle>
           <a:p>
-            <a:fld id="{1F412440-1B23-604B-B178-CB159C9EC6EA}" type="slidenum">
+            <a:fld id="{8C71CAF9-4461-454A-B702-D536C3775752}" type="slidenum">
               <a:rPr lang="en-US" smtClean="0"/>
               <a:t>‹#›</a:t>
             </a:fld>
@@ -2630,7 +2651,7 @@
     </p:spTree>
     <p:extLst>
       <p:ext uri="{BB962C8B-B14F-4D97-AF65-F5344CB8AC3E}">
-        <p14:creationId xmlns:p14="http://schemas.microsoft.com/office/powerpoint/2010/main" val="1014290460"/>
+        <p14:creationId xmlns:p14="http://schemas.microsoft.com/office/powerpoint/2010/main" val="3931132979"/>
       </p:ext>
     </p:extLst>
   </p:cSld>
@@ -2676,7 +2697,7 @@
         <a:spcBef>
           <a:spcPts val="1000"/>
         </a:spcBef>
-        <a:buFont typeface="Arial"/>
+        <a:buFont typeface="Arial" panose="020B0604020202020204" pitchFamily="34" charset="0"/>
         <a:buChar char="•"/>
         <a:defRPr sz="2800" kern="1200">
           <a:solidFill>
@@ -2694,7 +2715,7 @@
         <a:spcBef>
           <a:spcPts val="500"/>
         </a:spcBef>
-        <a:buFont typeface="Arial"/>
+        <a:buFont typeface="Arial" panose="020B0604020202020204" pitchFamily="34" charset="0"/>
         <a:buChar char="•"/>
         <a:defRPr sz="2400" kern="1200">
           <a:solidFill>
@@ -2712,7 +2733,7 @@
         <a:spcBef>
           <a:spcPts val="500"/>
         </a:spcBef>
-        <a:buFont typeface="Arial"/>
+        <a:buFont typeface="Arial" panose="020B0604020202020204" pitchFamily="34" charset="0"/>
         <a:buChar char="•"/>
         <a:defRPr sz="2000" kern="1200">
           <a:solidFill>
@@ -2730,7 +2751,7 @@
         <a:spcBef>
           <a:spcPts val="500"/>
         </a:spcBef>
-        <a:buFont typeface="Arial"/>
+        <a:buFont typeface="Arial" panose="020B0604020202020204" pitchFamily="34" charset="0"/>
         <a:buChar char="•"/>
         <a:defRPr sz="1800" kern="1200">
           <a:solidFill>
@@ -2748,7 +2769,7 @@
         <a:spcBef>
           <a:spcPts val="500"/>
         </a:spcBef>
-        <a:buFont typeface="Arial"/>
+        <a:buFont typeface="Arial" panose="020B0604020202020204" pitchFamily="34" charset="0"/>
         <a:buChar char="•"/>
         <a:defRPr sz="1800" kern="1200">
           <a:solidFill>
@@ -2766,7 +2787,7 @@
         <a:spcBef>
           <a:spcPts val="500"/>
         </a:spcBef>
-        <a:buFont typeface="Arial"/>
+        <a:buFont typeface="Arial" panose="020B0604020202020204" pitchFamily="34" charset="0"/>
         <a:buChar char="•"/>
         <a:defRPr sz="1800" kern="1200">
           <a:solidFill>
@@ -2784,7 +2805,7 @@
         <a:spcBef>
           <a:spcPts val="500"/>
         </a:spcBef>
-        <a:buFont typeface="Arial"/>
+        <a:buFont typeface="Arial" panose="020B0604020202020204" pitchFamily="34" charset="0"/>
         <a:buChar char="•"/>
         <a:defRPr sz="1800" kern="1200">
           <a:solidFill>
@@ -2802,7 +2823,7 @@
         <a:spcBef>
           <a:spcPts val="500"/>
         </a:spcBef>
-        <a:buFont typeface="Arial"/>
+        <a:buFont typeface="Arial" panose="020B0604020202020204" pitchFamily="34" charset="0"/>
         <a:buChar char="•"/>
         <a:defRPr sz="1800" kern="1200">
           <a:solidFill>
@@ -2820,7 +2841,7 @@
         <a:spcBef>
           <a:spcPts val="500"/>
         </a:spcBef>
-        <a:buFont typeface="Arial"/>
+        <a:buFont typeface="Arial" panose="020B0604020202020204" pitchFamily="34" charset="0"/>
         <a:buChar char="•"/>
         <a:defRPr sz="1800" kern="1200">
           <a:solidFill>
@@ -2989,7 +3010,7 @@
     </p:spTree>
     <p:extLst>
       <p:ext uri="{BB962C8B-B14F-4D97-AF65-F5344CB8AC3E}">
-        <p14:creationId xmlns:p14="http://schemas.microsoft.com/office/powerpoint/2010/main" val="2053717610"/>
+        <p14:creationId xmlns:p14="http://schemas.microsoft.com/office/powerpoint/2010/main" val="4157082590"/>
       </p:ext>
     </p:extLst>
   </p:cSld>
@@ -3045,9 +3066,9 @@
         <a:latin typeface="Calibri Light" panose="020F0302020204030204"/>
         <a:ea typeface=""/>
         <a:cs typeface=""/>
-        <a:font script="Jpan" typeface="Yu Gothic Light"/>
+        <a:font script="Jpan" typeface="ＭＳ Ｐゴシック"/>
         <a:font script="Hang" typeface="맑은 고딕"/>
-        <a:font script="Hans" typeface="DengXian Light"/>
+        <a:font script="Hans" typeface="宋体"/>
         <a:font script="Hant" typeface="新細明體"/>
         <a:font script="Arab" typeface="Times New Roman"/>
         <a:font script="Hebr" typeface="Times New Roman"/>
@@ -3080,9 +3101,9 @@
         <a:latin typeface="Calibri" panose="020F0502020204030204"/>
         <a:ea typeface=""/>
         <a:cs typeface=""/>
-        <a:font script="Jpan" typeface="Yu Gothic"/>
+        <a:font script="Jpan" typeface="ＭＳ Ｐゴシック"/>
         <a:font script="Hang" typeface="맑은 고딕"/>
-        <a:font script="Hans" typeface="DengXian"/>
+        <a:font script="Hans" typeface="宋体"/>
         <a:font script="Hant" typeface="新細明體"/>
         <a:font script="Arab" typeface="Arial"/>
         <a:font script="Hebr" typeface="Arial"/>

</xml_diff>